<commit_message>
slight edit to week 4
</commit_message>
<xml_diff>
--- a/Week4.pptx
+++ b/Week4.pptx
@@ -250,7 +250,7 @@
           <a:p>
             <a:fld id="{740001C3-55E0-DE41-9D32-5938E0AF0947}" type="datetimeFigureOut">
               <a:rPr lang="en-US" smtClean="0"/>
-              <a:t>9/17/17</a:t>
+              <a:t>9/22/17</a:t>
             </a:fld>
             <a:endParaRPr lang="en-US"/>
           </a:p>
@@ -420,7 +420,7 @@
           <a:p>
             <a:fld id="{740001C3-55E0-DE41-9D32-5938E0AF0947}" type="datetimeFigureOut">
               <a:rPr lang="en-US" smtClean="0"/>
-              <a:t>9/17/17</a:t>
+              <a:t>9/22/17</a:t>
             </a:fld>
             <a:endParaRPr lang="en-US"/>
           </a:p>
@@ -600,7 +600,7 @@
           <a:p>
             <a:fld id="{740001C3-55E0-DE41-9D32-5938E0AF0947}" type="datetimeFigureOut">
               <a:rPr lang="en-US" smtClean="0"/>
-              <a:t>9/17/17</a:t>
+              <a:t>9/22/17</a:t>
             </a:fld>
             <a:endParaRPr lang="en-US"/>
           </a:p>
@@ -770,7 +770,7 @@
           <a:p>
             <a:fld id="{740001C3-55E0-DE41-9D32-5938E0AF0947}" type="datetimeFigureOut">
               <a:rPr lang="en-US" smtClean="0"/>
-              <a:t>9/17/17</a:t>
+              <a:t>9/22/17</a:t>
             </a:fld>
             <a:endParaRPr lang="en-US"/>
           </a:p>
@@ -1016,7 +1016,7 @@
           <a:p>
             <a:fld id="{740001C3-55E0-DE41-9D32-5938E0AF0947}" type="datetimeFigureOut">
               <a:rPr lang="en-US" smtClean="0"/>
-              <a:t>9/17/17</a:t>
+              <a:t>9/22/17</a:t>
             </a:fld>
             <a:endParaRPr lang="en-US"/>
           </a:p>
@@ -1248,7 +1248,7 @@
           <a:p>
             <a:fld id="{740001C3-55E0-DE41-9D32-5938E0AF0947}" type="datetimeFigureOut">
               <a:rPr lang="en-US" smtClean="0"/>
-              <a:t>9/17/17</a:t>
+              <a:t>9/22/17</a:t>
             </a:fld>
             <a:endParaRPr lang="en-US"/>
           </a:p>
@@ -1615,7 +1615,7 @@
           <a:p>
             <a:fld id="{740001C3-55E0-DE41-9D32-5938E0AF0947}" type="datetimeFigureOut">
               <a:rPr lang="en-US" smtClean="0"/>
-              <a:t>9/17/17</a:t>
+              <a:t>9/22/17</a:t>
             </a:fld>
             <a:endParaRPr lang="en-US"/>
           </a:p>
@@ -1733,7 +1733,7 @@
           <a:p>
             <a:fld id="{740001C3-55E0-DE41-9D32-5938E0AF0947}" type="datetimeFigureOut">
               <a:rPr lang="en-US" smtClean="0"/>
-              <a:t>9/17/17</a:t>
+              <a:t>9/22/17</a:t>
             </a:fld>
             <a:endParaRPr lang="en-US"/>
           </a:p>
@@ -1828,7 +1828,7 @@
           <a:p>
             <a:fld id="{740001C3-55E0-DE41-9D32-5938E0AF0947}" type="datetimeFigureOut">
               <a:rPr lang="en-US" smtClean="0"/>
-              <a:t>9/17/17</a:t>
+              <a:t>9/22/17</a:t>
             </a:fld>
             <a:endParaRPr lang="en-US"/>
           </a:p>
@@ -2105,7 +2105,7 @@
           <a:p>
             <a:fld id="{740001C3-55E0-DE41-9D32-5938E0AF0947}" type="datetimeFigureOut">
               <a:rPr lang="en-US" smtClean="0"/>
-              <a:t>9/17/17</a:t>
+              <a:t>9/22/17</a:t>
             </a:fld>
             <a:endParaRPr lang="en-US"/>
           </a:p>
@@ -2358,7 +2358,7 @@
           <a:p>
             <a:fld id="{740001C3-55E0-DE41-9D32-5938E0AF0947}" type="datetimeFigureOut">
               <a:rPr lang="en-US" smtClean="0"/>
-              <a:t>9/17/17</a:t>
+              <a:t>9/22/17</a:t>
             </a:fld>
             <a:endParaRPr lang="en-US"/>
           </a:p>
@@ -2571,7 +2571,7 @@
           <a:p>
             <a:fld id="{740001C3-55E0-DE41-9D32-5938E0AF0947}" type="datetimeFigureOut">
               <a:rPr lang="en-US" smtClean="0"/>
-              <a:t>9/17/17</a:t>
+              <a:t>9/22/17</a:t>
             </a:fld>
             <a:endParaRPr lang="en-US"/>
           </a:p>
@@ -3626,8 +3626,20 @@
             </a:r>
             <a:r>
               <a:rPr lang="en-US" dirty="0"/>
-              <a:t> fetch upstream</a:t>
-            </a:r>
+              <a:t> fetch </a:t>
+            </a:r>
+            <a:r>
+              <a:rPr lang="en-US" dirty="0" smtClean="0"/>
+              <a:t>upstream</a:t>
+            </a:r>
+          </a:p>
+          <a:p>
+            <a:pPr lvl="1"/>
+            <a:r>
+              <a:rPr lang="en-US" dirty="0" smtClean="0"/>
+              <a:t>(note: we have not really used this functionality in class)</a:t>
+            </a:r>
+            <a:endParaRPr lang="en-US" dirty="0"/>
           </a:p>
           <a:p>
             <a:endParaRPr lang="en-US" dirty="0"/>

</xml_diff>